<commit_message>
iconic species slide for Twitter
</commit_message>
<xml_diff>
--- a/prep/ICO/v2021/IconicSpecies_template_BHI.pptx
+++ b/prep/ICO/v2021/IconicSpecies_template_BHI.pptx
@@ -1333,7 +1333,7 @@
           <a:p>
             <a:fld id="{DDA51639-B2D6-4652-B8C3-1B4C224A7BAF}" type="datetimeFigureOut">
               <a:rPr lang="en-US" smtClean="0"/>
-              <a:t>2/15/21</a:t>
+              <a:t>2/16/21</a:t>
             </a:fld>
             <a:endParaRPr lang="en-US" dirty="0"/>
           </a:p>
@@ -2347,7 +2347,7 @@
           <a:p>
             <a:fld id="{AB334A90-EB03-42F3-8859-2C2B2724C058}" type="datetimeFigureOut">
               <a:rPr lang="en-US" smtClean="0"/>
-              <a:t>2/15/21</a:t>
+              <a:t>2/16/21</a:t>
             </a:fld>
             <a:endParaRPr lang="en-US" dirty="0"/>
           </a:p>
@@ -2528,7 +2528,7 @@
           <a:p>
             <a:fld id="{D11A6AA8-A04B-4104-9AE2-BD48D340E27F}" type="datetimeFigureOut">
               <a:rPr lang="en-US" smtClean="0"/>
-              <a:t>2/15/21</a:t>
+              <a:t>2/16/21</a:t>
             </a:fld>
             <a:endParaRPr lang="en-US" dirty="0"/>
           </a:p>
@@ -2708,7 +2708,7 @@
           <a:p>
             <a:fld id="{B4E0BF79-FAC6-4A96-8DE1-F7B82E2E1652}" type="datetimeFigureOut">
               <a:rPr lang="en-US" smtClean="0"/>
-              <a:t>2/15/21</a:t>
+              <a:t>2/16/21</a:t>
             </a:fld>
             <a:endParaRPr lang="en-US" dirty="0"/>
           </a:p>
@@ -2918,7 +2918,7 @@
           <a:p>
             <a:fld id="{EB9CAEF6-B338-F34C-8A35-2264F1967BA0}" type="datetimeFigureOut">
               <a:rPr lang="en-SE" smtClean="0"/>
-              <a:t>2021-02-15</a:t>
+              <a:t>2021-02-16</a:t>
             </a:fld>
             <a:endParaRPr lang="en-SE"/>
           </a:p>
@@ -3118,7 +3118,7 @@
           <a:p>
             <a:fld id="{EB9CAEF6-B338-F34C-8A35-2264F1967BA0}" type="datetimeFigureOut">
               <a:rPr lang="en-SE" smtClean="0"/>
-              <a:t>2021-02-15</a:t>
+              <a:t>2021-02-16</a:t>
             </a:fld>
             <a:endParaRPr lang="en-SE"/>
           </a:p>
@@ -3394,7 +3394,7 @@
           <a:p>
             <a:fld id="{EB9CAEF6-B338-F34C-8A35-2264F1967BA0}" type="datetimeFigureOut">
               <a:rPr lang="en-SE" smtClean="0"/>
-              <a:t>2021-02-15</a:t>
+              <a:t>2021-02-16</a:t>
             </a:fld>
             <a:endParaRPr lang="en-SE"/>
           </a:p>
@@ -3662,7 +3662,7 @@
           <a:p>
             <a:fld id="{EB9CAEF6-B338-F34C-8A35-2264F1967BA0}" type="datetimeFigureOut">
               <a:rPr lang="en-SE" smtClean="0"/>
-              <a:t>2021-02-15</a:t>
+              <a:t>2021-02-16</a:t>
             </a:fld>
             <a:endParaRPr lang="en-SE"/>
           </a:p>
@@ -4077,7 +4077,7 @@
           <a:p>
             <a:fld id="{EB9CAEF6-B338-F34C-8A35-2264F1967BA0}" type="datetimeFigureOut">
               <a:rPr lang="en-SE" smtClean="0"/>
-              <a:t>2021-02-15</a:t>
+              <a:t>2021-02-16</a:t>
             </a:fld>
             <a:endParaRPr lang="en-SE"/>
           </a:p>
@@ -4219,7 +4219,7 @@
           <a:p>
             <a:fld id="{EB9CAEF6-B338-F34C-8A35-2264F1967BA0}" type="datetimeFigureOut">
               <a:rPr lang="en-SE" smtClean="0"/>
-              <a:t>2021-02-15</a:t>
+              <a:t>2021-02-16</a:t>
             </a:fld>
             <a:endParaRPr lang="en-SE"/>
           </a:p>
@@ -4332,7 +4332,7 @@
           <a:p>
             <a:fld id="{EB9CAEF6-B338-F34C-8A35-2264F1967BA0}" type="datetimeFigureOut">
               <a:rPr lang="en-SE" smtClean="0"/>
-              <a:t>2021-02-15</a:t>
+              <a:t>2021-02-16</a:t>
             </a:fld>
             <a:endParaRPr lang="en-SE"/>
           </a:p>
@@ -4474,7 +4474,7 @@
           <a:p>
             <a:fld id="{CBC48EC7-AF6A-48D3-8284-14BACBEBDD84}" type="datetimeFigureOut">
               <a:rPr lang="en-US" smtClean="0"/>
-              <a:t>2/15/21</a:t>
+              <a:t>2/16/21</a:t>
             </a:fld>
             <a:endParaRPr lang="en-US" dirty="0"/>
           </a:p>
@@ -4788,7 +4788,7 @@
           <a:p>
             <a:fld id="{EB9CAEF6-B338-F34C-8A35-2264F1967BA0}" type="datetimeFigureOut">
               <a:rPr lang="en-SE" smtClean="0"/>
-              <a:t>2021-02-15</a:t>
+              <a:t>2021-02-16</a:t>
             </a:fld>
             <a:endParaRPr lang="en-SE"/>
           </a:p>
@@ -5077,7 +5077,7 @@
           <a:p>
             <a:fld id="{EB9CAEF6-B338-F34C-8A35-2264F1967BA0}" type="datetimeFigureOut">
               <a:rPr lang="en-SE" smtClean="0"/>
-              <a:t>2021-02-15</a:t>
+              <a:t>2021-02-16</a:t>
             </a:fld>
             <a:endParaRPr lang="en-SE"/>
           </a:p>
@@ -5277,7 +5277,7 @@
           <a:p>
             <a:fld id="{EB9CAEF6-B338-F34C-8A35-2264F1967BA0}" type="datetimeFigureOut">
               <a:rPr lang="en-SE" smtClean="0"/>
-              <a:t>2021-02-15</a:t>
+              <a:t>2021-02-16</a:t>
             </a:fld>
             <a:endParaRPr lang="en-SE"/>
           </a:p>
@@ -5487,7 +5487,7 @@
           <a:p>
             <a:fld id="{EB9CAEF6-B338-F34C-8A35-2264F1967BA0}" type="datetimeFigureOut">
               <a:rPr lang="en-SE" smtClean="0"/>
-              <a:t>2021-02-15</a:t>
+              <a:t>2021-02-16</a:t>
             </a:fld>
             <a:endParaRPr lang="en-SE"/>
           </a:p>
@@ -5669,7 +5669,7 @@
           <a:p>
             <a:fld id="{82FF5DD9-2C52-442D-92E2-8072C0C3D7CD}" type="datetimeFigureOut">
               <a:rPr lang="en-US" smtClean="0"/>
-              <a:t>2/15/21</a:t>
+              <a:t>2/16/21</a:t>
             </a:fld>
             <a:endParaRPr lang="en-US" dirty="0"/>
           </a:p>
@@ -5946,7 +5946,7 @@
           <a:p>
             <a:fld id="{C44961B7-6B89-48AB-966F-622E2788EECC}" type="datetimeFigureOut">
               <a:rPr lang="en-US" smtClean="0"/>
-              <a:t>2/15/21</a:t>
+              <a:t>2/16/21</a:t>
             </a:fld>
             <a:endParaRPr lang="en-US" dirty="0"/>
           </a:p>
@@ -7147,7 +7147,7 @@
           <a:p>
             <a:fld id="{DBD3D6FB-79CC-4683-A046-BBE785BA1BED}" type="datetimeFigureOut">
               <a:rPr lang="en-US" smtClean="0"/>
-              <a:t>2/15/21</a:t>
+              <a:t>2/16/21</a:t>
             </a:fld>
             <a:endParaRPr lang="en-US" dirty="0"/>
           </a:p>
@@ -7537,7 +7537,7 @@
           <a:p>
             <a:fld id="{9512B3E8-48F1-4B23-8498-D8A04A81EC9C}" type="datetimeFigureOut">
               <a:rPr lang="en-US" smtClean="0"/>
-              <a:t>2/15/21</a:t>
+              <a:t>2/16/21</a:t>
             </a:fld>
             <a:endParaRPr lang="en-US" dirty="0"/>
           </a:p>
@@ -7660,7 +7660,7 @@
           <a:p>
             <a:fld id="{10B90D90-AA62-404D-A741-635B4370F9CB}" type="datetimeFigureOut">
               <a:rPr lang="en-US" smtClean="0"/>
-              <a:t>2/15/21</a:t>
+              <a:t>2/16/21</a:t>
             </a:fld>
             <a:endParaRPr lang="en-US" dirty="0"/>
           </a:p>
@@ -7755,7 +7755,7 @@
           <a:p>
             <a:fld id="{A57002E4-6836-46D1-9DBB-3C27C0DD3A89}" type="datetimeFigureOut">
               <a:rPr lang="en-US" smtClean="0"/>
-              <a:t>2/15/21</a:t>
+              <a:t>2/16/21</a:t>
             </a:fld>
             <a:endParaRPr lang="en-US" dirty="0"/>
           </a:p>
@@ -8518,7 +8518,7 @@
           <a:p>
             <a:fld id="{1CF131DD-A141-4471-BCF9-C6073EDD7E20}" type="datetimeFigureOut">
               <a:rPr lang="en-US" smtClean="0"/>
-              <a:t>2/15/21</a:t>
+              <a:t>2/16/21</a:t>
             </a:fld>
             <a:endParaRPr lang="en-US" dirty="0"/>
           </a:p>
@@ -8795,7 +8795,7 @@
           <a:p>
             <a:fld id="{CBC48EC7-AF6A-48D3-8284-14BACBEBDD84}" type="datetimeFigureOut">
               <a:rPr lang="en-US" smtClean="0"/>
-              <a:t>2/15/21</a:t>
+              <a:t>2/16/21</a:t>
             </a:fld>
             <a:endParaRPr lang="en-US" dirty="0"/>
           </a:p>
@@ -9950,7 +9950,7 @@
           <a:p>
             <a:fld id="{EB9CAEF6-B338-F34C-8A35-2264F1967BA0}" type="datetimeFigureOut">
               <a:rPr lang="en-SE" smtClean="0"/>
-              <a:t>2021-02-15</a:t>
+              <a:t>2021-02-16</a:t>
             </a:fld>
             <a:endParaRPr lang="en-SE"/>
           </a:p>
@@ -10351,8 +10351,22 @@
 </file>
 
 <file path=ppt/slides/slide1.xml><?xml version="1.0" encoding="utf-8"?>
-<p:sld xmlns:a="http://schemas.openxmlformats.org/drawingml/2006/main" xmlns:r="http://schemas.openxmlformats.org/officeDocument/2006/relationships" xmlns:p="http://schemas.openxmlformats.org/presentationml/2006/main">
+<p:sld xmlns:a="http://schemas.openxmlformats.org/drawingml/2006/main" xmlns:r="http://schemas.openxmlformats.org/officeDocument/2006/relationships" xmlns:p="http://schemas.openxmlformats.org/presentationml/2006/main" showMasterSp="0">
   <p:cSld>
+    <p:bg>
+      <p:bgPr>
+        <a:blipFill dpi="0" rotWithShape="1">
+          <a:blip r:embed="rId2">
+            <a:lum/>
+          </a:blip>
+          <a:srcRect/>
+          <a:stretch>
+            <a:fillRect l="-2000" r="-2000"/>
+          </a:stretch>
+        </a:blipFill>
+        <a:effectLst/>
+      </p:bgPr>
+    </p:bg>
     <p:spTree>
       <p:nvGrpSpPr>
         <p:cNvPr id="1" name=""/>
@@ -10367,36 +10381,6 @@
           <a:chExt cx="0" cy="0"/>
         </a:xfrm>
       </p:grpSpPr>
-      <p:pic>
-        <p:nvPicPr>
-          <p:cNvPr id="6" name="Content Placeholder 4">
-            <a:extLst>
-              <a:ext uri="{FF2B5EF4-FFF2-40B4-BE49-F238E27FC236}">
-                <a16:creationId xmlns:a16="http://schemas.microsoft.com/office/drawing/2014/main" id="{9871961C-F98E-3A45-9DC2-6049F9D66C06}"/>
-              </a:ext>
-            </a:extLst>
-          </p:cNvPr>
-          <p:cNvPicPr>
-            <a:picLocks noChangeAspect="1"/>
-          </p:cNvPicPr>
-          <p:nvPr/>
-        </p:nvPicPr>
-        <p:blipFill>
-          <a:blip r:embed="rId2"/>
-          <a:stretch>
-            <a:fillRect/>
-          </a:stretch>
-        </p:blipFill>
-        <p:spPr>
-          <a:xfrm>
-            <a:off x="0" y="-30302"/>
-            <a:ext cx="12192000" cy="6883456"/>
-          </a:xfrm>
-          <a:prstGeom prst="rect">
-            <a:avLst/>
-          </a:prstGeom>
-        </p:spPr>
-      </p:pic>
       <p:sp>
         <p:nvSpPr>
           <p:cNvPr id="2" name="Title 1">

</xml_diff>